<commit_message>
pp and dd update
</commit_message>
<xml_diff>
--- a/presentation/RBST_prompt-eng.pptx
+++ b/presentation/RBST_prompt-eng.pptx
@@ -5,7 +5,7 @@
     <p:sldMasterId id="2147483648" r:id="rId1"/>
   </p:sldMasterIdLst>
   <p:notesMasterIdLst>
-    <p:notesMasterId r:id="rId11"/>
+    <p:notesMasterId r:id="rId12"/>
   </p:notesMasterIdLst>
   <p:sldIdLst>
     <p:sldId id="256" r:id="rId2"/>
@@ -14,9 +14,10 @@
     <p:sldId id="264" r:id="rId5"/>
     <p:sldId id="260" r:id="rId6"/>
     <p:sldId id="261" r:id="rId7"/>
-    <p:sldId id="262" r:id="rId8"/>
-    <p:sldId id="263" r:id="rId9"/>
-    <p:sldId id="265" r:id="rId10"/>
+    <p:sldId id="266" r:id="rId8"/>
+    <p:sldId id="262" r:id="rId9"/>
+    <p:sldId id="263" r:id="rId10"/>
+    <p:sldId id="265" r:id="rId11"/>
   </p:sldIdLst>
   <p:sldSz cx="12192000" cy="6858000"/>
   <p:notesSz cx="6858000" cy="9144000"/>
@@ -4866,6 +4867,14 @@
 <file path=ppt/slides/slide1.xml><?xml version="1.0" encoding="utf-8"?>
 <p:sld xmlns:a="http://schemas.openxmlformats.org/drawingml/2006/main" xmlns:r="http://schemas.openxmlformats.org/officeDocument/2006/relationships" xmlns:p="http://schemas.openxmlformats.org/presentationml/2006/main">
   <p:cSld>
+    <p:bg>
+      <p:bgPr>
+        <a:solidFill>
+          <a:schemeClr val="bg1"/>
+        </a:solidFill>
+        <a:effectLst/>
+      </p:bgPr>
+    </p:bg>
     <p:spTree>
       <p:nvGrpSpPr>
         <p:cNvPr id="1" name=""/>
@@ -4880,41 +4889,102 @@
           <a:chExt cx="0" cy="0"/>
         </a:xfrm>
       </p:grpSpPr>
-      <p:sp>
-        <p:nvSpPr>
-          <p:cNvPr id="2" name="Title 1">
-            <a:extLst>
-              <a:ext uri="{FF2B5EF4-FFF2-40B4-BE49-F238E27FC236}">
-                <a16:creationId xmlns:a16="http://schemas.microsoft.com/office/drawing/2014/main" id="{F8273AE9-0814-0447-863E-3B7A732241C5}"/>
-              </a:ext>
-            </a:extLst>
-          </p:cNvPr>
-          <p:cNvSpPr>
-            <a:spLocks noGrp="1"/>
-          </p:cNvSpPr>
-          <p:nvPr>
-            <p:ph type="ctrTitle"/>
+      <p:sp useBgFill="1">
+        <p:nvSpPr>
+          <p:cNvPr id="40" name="Rectangle 39">
+            <a:extLst>
+              <a:ext uri="{FF2B5EF4-FFF2-40B4-BE49-F238E27FC236}">
+                <a16:creationId xmlns:a16="http://schemas.microsoft.com/office/drawing/2014/main" id="{BAD76F3E-3A97-486B-B402-44400A8B9173}"/>
+              </a:ext>
+              <a:ext uri="{C183D7F6-B498-43B3-948B-1728B52AA6E4}">
+                <adec:decorative xmlns:adec="http://schemas.microsoft.com/office/drawing/2017/decorative" val="1"/>
+              </a:ext>
+            </a:extLst>
+          </p:cNvPr>
+          <p:cNvSpPr>
+            <a:spLocks noGrp="1" noRot="1" noChangeAspect="1" noMove="1" noResize="1" noEditPoints="1" noAdjustHandles="1" noChangeArrowheads="1" noChangeShapeType="1" noTextEdit="1"/>
+          </p:cNvSpPr>
+          <p:nvPr>
+            <p:extLst>
+              <p:ext uri="{386F3935-93C4-4BCD-93E2-E3B085C9AB24}">
+                <p16:designElem xmlns:p16="http://schemas.microsoft.com/office/powerpoint/2015/main" val="1"/>
+              </p:ext>
+            </p:extLst>
           </p:nvPr>
         </p:nvSpPr>
         <p:spPr>
           <a:xfrm>
-            <a:off x="1524000" y="1003300"/>
-            <a:ext cx="9144000" cy="2703513"/>
+            <a:off x="0" y="0"/>
+            <a:ext cx="12192000" cy="6858000"/>
+          </a:xfrm>
+          <a:prstGeom prst="rect">
+            <a:avLst/>
+          </a:prstGeom>
+          <a:ln>
+            <a:noFill/>
+          </a:ln>
+        </p:spPr>
+        <p:style>
+          <a:lnRef idx="2">
+            <a:schemeClr val="accent1">
+              <a:shade val="50000"/>
+            </a:schemeClr>
+          </a:lnRef>
+          <a:fillRef idx="1">
+            <a:schemeClr val="accent1"/>
+          </a:fillRef>
+          <a:effectRef idx="0">
+            <a:schemeClr val="accent1"/>
+          </a:effectRef>
+          <a:fontRef idx="minor">
+            <a:schemeClr val="lt1"/>
+          </a:fontRef>
+        </p:style>
+        <p:txBody>
+          <a:bodyPr rtlCol="0" anchor="ctr"/>
+          <a:lstStyle/>
+          <a:p>
+            <a:pPr algn="ctr"/>
+            <a:endParaRPr lang="en-US"/>
+          </a:p>
+        </p:txBody>
+      </p:sp>
+      <p:sp>
+        <p:nvSpPr>
+          <p:cNvPr id="2" name="Title 1">
+            <a:extLst>
+              <a:ext uri="{FF2B5EF4-FFF2-40B4-BE49-F238E27FC236}">
+                <a16:creationId xmlns:a16="http://schemas.microsoft.com/office/drawing/2014/main" id="{F8273AE9-0814-0447-863E-3B7A732241C5}"/>
+              </a:ext>
+            </a:extLst>
+          </p:cNvPr>
+          <p:cNvSpPr>
+            <a:spLocks noGrp="1"/>
+          </p:cNvSpPr>
+          <p:nvPr>
+            <p:ph type="ctrTitle"/>
+          </p:nvPr>
+        </p:nvSpPr>
+        <p:spPr>
+          <a:xfrm>
+            <a:off x="838199" y="1093788"/>
+            <a:ext cx="10506455" cy="2967208"/>
           </a:xfrm>
         </p:spPr>
         <p:txBody>
           <a:bodyPr>
-            <a:noAutofit/>
+            <a:normAutofit/>
           </a:bodyPr>
           <a:lstStyle/>
           <a:p>
-            <a:r>
-              <a:rPr lang="en-GB" sz="4800" dirty="0">
+            <a:pPr algn="l"/>
+            <a:r>
+              <a:rPr lang="en-GB" sz="5000" dirty="0">
                 <a:latin typeface="Consolas" panose="020B0609020204030204" pitchFamily="49" charset="0"/>
               </a:rPr>
               <a:t>Feasibility of Using Large Language Models for Requirement-Based Software Testing</a:t>
             </a:r>
-            <a:endParaRPr lang="en-AT" sz="16600" dirty="0">
+            <a:endParaRPr lang="en-AT" sz="5000" dirty="0">
               <a:latin typeface="Consolas" panose="020B0609020204030204" pitchFamily="49" charset="0"/>
             </a:endParaRPr>
           </a:p>
@@ -4938,15 +5008,186 @@
         </p:nvSpPr>
         <p:spPr>
           <a:xfrm>
-            <a:off x="1524000" y="4306888"/>
-            <a:ext cx="9144000" cy="1655762"/>
+            <a:off x="7400924" y="4619624"/>
+            <a:ext cx="3946779" cy="1038225"/>
           </a:xfrm>
         </p:spPr>
         <p:txBody>
-          <a:bodyPr/>
+          <a:bodyPr>
+            <a:normAutofit/>
+          </a:bodyPr>
           <a:lstStyle/>
           <a:p>
+            <a:pPr algn="r"/>
+            <a:r>
+              <a:rPr lang="en-GB" dirty="0"/>
+              <a:t>Alexander Seyr</a:t>
+            </a:r>
+          </a:p>
+          <a:p>
+            <a:pPr algn="r"/>
             <a:endParaRPr lang="en-AT" dirty="0"/>
+          </a:p>
+        </p:txBody>
+      </p:sp>
+      <p:sp>
+        <p:nvSpPr>
+          <p:cNvPr id="41" name="Rectangle 40">
+            <a:extLst>
+              <a:ext uri="{FF2B5EF4-FFF2-40B4-BE49-F238E27FC236}">
+                <a16:creationId xmlns:a16="http://schemas.microsoft.com/office/drawing/2014/main" id="{391F6B52-91F4-4AEB-B6DB-29FEBCF28C8B}"/>
+              </a:ext>
+              <a:ext uri="{C183D7F6-B498-43B3-948B-1728B52AA6E4}">
+                <adec:decorative xmlns:adec="http://schemas.microsoft.com/office/drawing/2017/decorative" val="1"/>
+              </a:ext>
+            </a:extLst>
+          </p:cNvPr>
+          <p:cNvSpPr>
+            <a:spLocks noGrp="1" noRot="1" noChangeAspect="1" noMove="1" noResize="1" noEditPoints="1" noAdjustHandles="1" noChangeArrowheads="1" noChangeShapeType="1" noTextEdit="1"/>
+          </p:cNvSpPr>
+          <p:nvPr>
+            <p:extLst>
+              <p:ext uri="{386F3935-93C4-4BCD-93E2-E3B085C9AB24}">
+                <p16:designElem xmlns:p16="http://schemas.microsoft.com/office/powerpoint/2015/main" val="1"/>
+              </p:ext>
+            </p:extLst>
+          </p:nvPr>
+        </p:nvSpPr>
+        <p:spPr>
+          <a:xfrm>
+            <a:off x="841248" y="4331166"/>
+            <a:ext cx="10506456" cy="18288"/>
+          </a:xfrm>
+          <a:prstGeom prst="rect">
+            <a:avLst/>
+          </a:prstGeom>
+          <a:solidFill>
+            <a:srgbClr val="D5D5D5"/>
+          </a:solidFill>
+          <a:ln w="3175">
+            <a:noFill/>
+          </a:ln>
+          <a:effectLst/>
+        </p:spPr>
+        <p:style>
+          <a:lnRef idx="2">
+            <a:schemeClr val="accent1">
+              <a:shade val="50000"/>
+            </a:schemeClr>
+          </a:lnRef>
+          <a:fillRef idx="1">
+            <a:schemeClr val="accent1"/>
+          </a:fillRef>
+          <a:effectRef idx="0">
+            <a:schemeClr val="accent1"/>
+          </a:effectRef>
+          <a:fontRef idx="minor">
+            <a:schemeClr val="lt1"/>
+          </a:fontRef>
+        </p:style>
+        <p:txBody>
+          <a:bodyPr rtlCol="0" anchor="ctr"/>
+          <a:lstStyle/>
+          <a:p>
+            <a:pPr algn="ctr"/>
+            <a:endParaRPr lang="en-US">
+              <a:solidFill>
+                <a:prstClr val="white"/>
+              </a:solidFill>
+              <a:latin typeface="Calibri" panose="020F0502020204030204"/>
+            </a:endParaRPr>
+          </a:p>
+        </p:txBody>
+      </p:sp>
+      <p:sp>
+        <p:nvSpPr>
+          <p:cNvPr id="42" name="Rectangle 41">
+            <a:extLst>
+              <a:ext uri="{FF2B5EF4-FFF2-40B4-BE49-F238E27FC236}">
+                <a16:creationId xmlns:a16="http://schemas.microsoft.com/office/drawing/2014/main" id="{2CD6F061-7C53-44F4-9794-953DB70A451B}"/>
+              </a:ext>
+              <a:ext uri="{C183D7F6-B498-43B3-948B-1728B52AA6E4}">
+                <adec:decorative xmlns:adec="http://schemas.microsoft.com/office/drawing/2017/decorative" val="1"/>
+              </a:ext>
+            </a:extLst>
+          </p:cNvPr>
+          <p:cNvSpPr>
+            <a:spLocks noGrp="1" noRot="1" noChangeAspect="1" noMove="1" noResize="1" noEditPoints="1" noAdjustHandles="1" noChangeArrowheads="1" noChangeShapeType="1" noTextEdit="1"/>
+          </p:cNvSpPr>
+          <p:nvPr>
+            <p:extLst>
+              <p:ext uri="{386F3935-93C4-4BCD-93E2-E3B085C9AB24}">
+                <p16:designElem xmlns:p16="http://schemas.microsoft.com/office/powerpoint/2015/main" val="1"/>
+              </p:ext>
+            </p:extLst>
+          </p:nvPr>
+        </p:nvSpPr>
+        <p:spPr>
+          <a:xfrm rot="5400000">
+            <a:off x="9346882" y="2348839"/>
+            <a:ext cx="54864" cy="3946779"/>
+          </a:xfrm>
+          <a:prstGeom prst="rect">
+            <a:avLst/>
+          </a:prstGeom>
+          <a:solidFill>
+            <a:schemeClr val="accent2"/>
+          </a:solidFill>
+          <a:ln>
+            <a:noFill/>
+          </a:ln>
+        </p:spPr>
+        <p:style>
+          <a:lnRef idx="2">
+            <a:schemeClr val="accent1">
+              <a:shade val="50000"/>
+            </a:schemeClr>
+          </a:lnRef>
+          <a:fillRef idx="1">
+            <a:schemeClr val="accent1"/>
+          </a:fillRef>
+          <a:effectRef idx="0">
+            <a:schemeClr val="accent1"/>
+          </a:effectRef>
+          <a:fontRef idx="minor">
+            <a:schemeClr val="lt1"/>
+          </a:fontRef>
+        </p:style>
+        <p:txBody>
+          <a:bodyPr rtlCol="0" anchor="ctr"/>
+          <a:lstStyle/>
+          <a:p>
+            <a:pPr marL="0" marR="0" lvl="0" indent="0" algn="ctr" defTabSz="914400" rtl="0" eaLnBrk="1" fontAlgn="auto" latinLnBrk="0" hangingPunct="1">
+              <a:lnSpc>
+                <a:spcPct val="100000"/>
+              </a:lnSpc>
+              <a:spcBef>
+                <a:spcPts val="0"/>
+              </a:spcBef>
+              <a:spcAft>
+                <a:spcPts val="0"/>
+              </a:spcAft>
+              <a:buClrTx/>
+              <a:buSzTx/>
+              <a:buFontTx/>
+              <a:buNone/>
+              <a:tabLst/>
+              <a:defRPr/>
+            </a:pPr>
+            <a:endParaRPr kumimoji="0" lang="en-US" sz="1800" b="0" i="0" u="none" strike="noStrike" kern="1200" cap="none" spc="0" normalizeH="0" baseline="0" noProof="0">
+              <a:ln>
+                <a:noFill/>
+              </a:ln>
+              <a:solidFill>
+                <a:prstClr val="white"/>
+              </a:solidFill>
+              <a:effectLst/>
+              <a:uLnTx/>
+              <a:uFillTx/>
+              <a:latin typeface="Calibri" panose="020F0502020204030204"/>
+              <a:ea typeface="+mn-ea"/>
+              <a:cs typeface="+mn-cs"/>
+            </a:endParaRPr>
           </a:p>
         </p:txBody>
       </p:sp>
@@ -4954,6 +5195,188 @@
     <p:extLst>
       <p:ext uri="{BB962C8B-B14F-4D97-AF65-F5344CB8AC3E}">
         <p14:creationId xmlns:p14="http://schemas.microsoft.com/office/powerpoint/2010/main" val="954719695"/>
+      </p:ext>
+    </p:extLst>
+  </p:cSld>
+  <p:clrMapOvr>
+    <a:masterClrMapping/>
+  </p:clrMapOvr>
+  <p:timing>
+    <p:tnLst>
+      <p:par>
+        <p:cTn id="1" dur="indefinite" restart="never" nodeType="tmRoot">
+          <p:childTnLst>
+            <p:seq concurrent="1" nextAc="seek">
+              <p:cTn id="2" dur="indefinite" nodeType="mainSeq">
+                <p:childTnLst>
+                  <p:par>
+                    <p:cTn id="3" fill="hold">
+                      <p:stCondLst>
+                        <p:cond delay="indefinite"/>
+                        <p:cond evt="onBegin" delay="0">
+                          <p:tn val="2"/>
+                        </p:cond>
+                      </p:stCondLst>
+                      <p:childTnLst>
+                        <p:par>
+                          <p:cTn id="4" fill="hold">
+                            <p:stCondLst>
+                              <p:cond delay="0"/>
+                            </p:stCondLst>
+                            <p:childTnLst>
+                              <p:par>
+                                <p:cTn id="5" presetID="10" presetClass="entr" presetSubtype="0" fill="hold" grpId="0" nodeType="withEffect">
+                                  <p:stCondLst>
+                                    <p:cond delay="500"/>
+                                  </p:stCondLst>
+                                  <p:iterate>
+                                    <p:tmPct val="10000"/>
+                                  </p:iterate>
+                                  <p:childTnLst>
+                                    <p:set>
+                                      <p:cBhvr>
+                                        <p:cTn id="6" dur="1" fill="hold">
+                                          <p:stCondLst>
+                                            <p:cond delay="0"/>
+                                          </p:stCondLst>
+                                        </p:cTn>
+                                        <p:tgtEl>
+                                          <p:spTgt spid="2"/>
+                                        </p:tgtEl>
+                                        <p:attrNameLst>
+                                          <p:attrName>style.visibility</p:attrName>
+                                        </p:attrNameLst>
+                                      </p:cBhvr>
+                                      <p:to>
+                                        <p:strVal val="visible"/>
+                                      </p:to>
+                                    </p:set>
+                                    <p:animEffect transition="in" filter="fade">
+                                      <p:cBhvr>
+                                        <p:cTn id="7" dur="700"/>
+                                        <p:tgtEl>
+                                          <p:spTgt spid="2"/>
+                                        </p:tgtEl>
+                                      </p:cBhvr>
+                                    </p:animEffect>
+                                  </p:childTnLst>
+                                </p:cTn>
+                              </p:par>
+                            </p:childTnLst>
+                          </p:cTn>
+                        </p:par>
+                      </p:childTnLst>
+                    </p:cTn>
+                  </p:par>
+                </p:childTnLst>
+              </p:cTn>
+              <p:prevCondLst>
+                <p:cond evt="onPrev" delay="0">
+                  <p:tgtEl>
+                    <p:sldTgt/>
+                  </p:tgtEl>
+                </p:cond>
+              </p:prevCondLst>
+              <p:nextCondLst>
+                <p:cond evt="onNext" delay="0">
+                  <p:tgtEl>
+                    <p:sldTgt/>
+                  </p:tgtEl>
+                </p:cond>
+              </p:nextCondLst>
+            </p:seq>
+          </p:childTnLst>
+        </p:cTn>
+      </p:par>
+    </p:tnLst>
+    <p:bldLst>
+      <p:bldP spid="2" grpId="0"/>
+    </p:bldLst>
+  </p:timing>
+</p:sld>
+</file>
+
+<file path=ppt/slides/slide10.xml><?xml version="1.0" encoding="utf-8"?>
+<p:sld xmlns:a="http://schemas.openxmlformats.org/drawingml/2006/main" xmlns:r="http://schemas.openxmlformats.org/officeDocument/2006/relationships" xmlns:p="http://schemas.openxmlformats.org/presentationml/2006/main">
+  <p:cSld>
+    <p:spTree>
+      <p:nvGrpSpPr>
+        <p:cNvPr id="1" name=""/>
+        <p:cNvGrpSpPr/>
+        <p:nvPr/>
+      </p:nvGrpSpPr>
+      <p:grpSpPr>
+        <a:xfrm>
+          <a:off x="0" y="0"/>
+          <a:ext cx="0" cy="0"/>
+          <a:chOff x="0" y="0"/>
+          <a:chExt cx="0" cy="0"/>
+        </a:xfrm>
+      </p:grpSpPr>
+      <p:sp>
+        <p:nvSpPr>
+          <p:cNvPr id="2" name="Title 1">
+            <a:extLst>
+              <a:ext uri="{FF2B5EF4-FFF2-40B4-BE49-F238E27FC236}">
+                <a16:creationId xmlns:a16="http://schemas.microsoft.com/office/drawing/2014/main" id="{46FE4B27-60D4-B8B2-87CB-62D6922487A6}"/>
+              </a:ext>
+            </a:extLst>
+          </p:cNvPr>
+          <p:cNvSpPr>
+            <a:spLocks noGrp="1"/>
+          </p:cNvSpPr>
+          <p:nvPr>
+            <p:ph type="title"/>
+          </p:nvPr>
+        </p:nvSpPr>
+        <p:spPr/>
+        <p:txBody>
+          <a:bodyPr/>
+          <a:lstStyle/>
+          <a:p>
+            <a:r>
+              <a:rPr lang="en-GB" dirty="0">
+                <a:latin typeface="Consolas" panose="020B0609020204030204" pitchFamily="49" charset="0"/>
+              </a:rPr>
+              <a:t>Q &amp; A</a:t>
+            </a:r>
+            <a:endParaRPr lang="en-AT" dirty="0">
+              <a:latin typeface="Consolas" panose="020B0609020204030204" pitchFamily="49" charset="0"/>
+            </a:endParaRPr>
+          </a:p>
+        </p:txBody>
+      </p:sp>
+      <p:sp>
+        <p:nvSpPr>
+          <p:cNvPr id="3" name="Content Placeholder 2">
+            <a:extLst>
+              <a:ext uri="{FF2B5EF4-FFF2-40B4-BE49-F238E27FC236}">
+                <a16:creationId xmlns:a16="http://schemas.microsoft.com/office/drawing/2014/main" id="{F9D6AE6E-165B-9A93-3AE4-16307F2A134A}"/>
+              </a:ext>
+            </a:extLst>
+          </p:cNvPr>
+          <p:cNvSpPr>
+            <a:spLocks noGrp="1"/>
+          </p:cNvSpPr>
+          <p:nvPr>
+            <p:ph idx="1"/>
+          </p:nvPr>
+        </p:nvSpPr>
+        <p:spPr/>
+        <p:txBody>
+          <a:bodyPr/>
+          <a:lstStyle/>
+          <a:p>
+            <a:endParaRPr lang="en-AT" dirty="0">
+              <a:latin typeface="Consolas" panose="020B0609020204030204" pitchFamily="49" charset="0"/>
+            </a:endParaRPr>
+          </a:p>
+        </p:txBody>
+      </p:sp>
+    </p:spTree>
+    <p:extLst>
+      <p:ext uri="{BB962C8B-B14F-4D97-AF65-F5344CB8AC3E}">
+        <p14:creationId xmlns:p14="http://schemas.microsoft.com/office/powerpoint/2010/main" val="3851137163"/>
       </p:ext>
     </p:extLst>
   </p:cSld>
@@ -5002,7 +5425,7 @@
           <a:lstStyle/>
           <a:p>
             <a:r>
-              <a:rPr lang="en-GB" dirty="0">
+              <a:rPr lang="en-GB">
                 <a:latin typeface="Consolas" panose="020B0609020204030204" pitchFamily="49" charset="0"/>
               </a:rPr>
               <a:t>Outline</a:t>
@@ -5189,7 +5612,7 @@
         </p:blipFill>
         <p:spPr>
           <a:xfrm>
-            <a:off x="8204270" y="1604678"/>
+            <a:off x="8156366" y="1397427"/>
             <a:ext cx="3400425" cy="2790825"/>
           </a:xfrm>
         </p:spPr>
@@ -5569,17 +5992,47 @@
           </a:p>
           <a:p>
             <a:r>
-              <a:rPr lang="en-GB" sz="1200" dirty="0">
+              <a:rPr lang="en-GB" sz="1600" dirty="0">
                 <a:latin typeface="Consolas" panose="020B0609020204030204" pitchFamily="49" charset="0"/>
               </a:rPr>
-              <a:t>Main focus of latest LLM research on System and Unit testing.</a:t>
-            </a:r>
-            <a:endParaRPr lang="en-AT" sz="1200" dirty="0">
+              <a:t>Most of LLM research on System and Unit testing</a:t>
+            </a:r>
+            <a:endParaRPr lang="en-AT" sz="1600" dirty="0">
               <a:latin typeface="Consolas" panose="020B0609020204030204" pitchFamily="49" charset="0"/>
             </a:endParaRPr>
           </a:p>
         </p:txBody>
       </p:sp>
+      <p:pic>
+        <p:nvPicPr>
+          <p:cNvPr id="7" name="Picture 6">
+            <a:extLst>
+              <a:ext uri="{FF2B5EF4-FFF2-40B4-BE49-F238E27FC236}">
+                <a16:creationId xmlns:a16="http://schemas.microsoft.com/office/drawing/2014/main" id="{8F93D3F5-F7D5-1320-E7E5-70F89E3F743B}"/>
+              </a:ext>
+            </a:extLst>
+          </p:cNvPr>
+          <p:cNvPicPr>
+            <a:picLocks noChangeAspect="1"/>
+          </p:cNvPicPr>
+          <p:nvPr/>
+        </p:nvPicPr>
+        <p:blipFill>
+          <a:blip r:embed="rId4"/>
+          <a:stretch>
+            <a:fillRect/>
+          </a:stretch>
+        </p:blipFill>
+        <p:spPr>
+          <a:xfrm>
+            <a:off x="7689954" y="4099721"/>
+            <a:ext cx="4055386" cy="2358033"/>
+          </a:xfrm>
+          <a:prstGeom prst="rect">
+            <a:avLst/>
+          </a:prstGeom>
+        </p:spPr>
+      </p:pic>
     </p:spTree>
     <p:extLst>
       <p:ext uri="{BB962C8B-B14F-4D97-AF65-F5344CB8AC3E}">
@@ -5648,6 +6101,35 @@
           </a:p>
         </p:txBody>
       </p:sp>
+      <p:pic>
+        <p:nvPicPr>
+          <p:cNvPr id="7" name="Content Placeholder 4">
+            <a:extLst>
+              <a:ext uri="{FF2B5EF4-FFF2-40B4-BE49-F238E27FC236}">
+                <a16:creationId xmlns:a16="http://schemas.microsoft.com/office/drawing/2014/main" id="{24381BF6-875C-C6D7-0F8A-56A34AFA6222}"/>
+              </a:ext>
+            </a:extLst>
+          </p:cNvPr>
+          <p:cNvPicPr>
+            <a:picLocks noGrp="1" noChangeAspect="1"/>
+          </p:cNvPicPr>
+          <p:nvPr>
+            <p:ph idx="1"/>
+          </p:nvPr>
+        </p:nvPicPr>
+        <p:blipFill>
+          <a:blip r:embed="rId3"/>
+          <a:stretch>
+            <a:fillRect/>
+          </a:stretch>
+        </p:blipFill>
+        <p:spPr>
+          <a:xfrm>
+            <a:off x="8189279" y="1567203"/>
+            <a:ext cx="3400425" cy="2790825"/>
+          </a:xfrm>
+        </p:spPr>
+      </p:pic>
       <p:sp>
         <p:nvSpPr>
           <p:cNvPr id="4" name="Content Placeholder 2">
@@ -6092,35 +6574,6 @@
       </p:sp>
       <p:pic>
         <p:nvPicPr>
-          <p:cNvPr id="7" name="Content Placeholder 4">
-            <a:extLst>
-              <a:ext uri="{FF2B5EF4-FFF2-40B4-BE49-F238E27FC236}">
-                <a16:creationId xmlns:a16="http://schemas.microsoft.com/office/drawing/2014/main" id="{24381BF6-875C-C6D7-0F8A-56A34AFA6222}"/>
-              </a:ext>
-            </a:extLst>
-          </p:cNvPr>
-          <p:cNvPicPr>
-            <a:picLocks noGrp="1" noChangeAspect="1"/>
-          </p:cNvPicPr>
-          <p:nvPr>
-            <p:ph idx="1"/>
-          </p:nvPr>
-        </p:nvPicPr>
-        <p:blipFill>
-          <a:blip r:embed="rId3"/>
-          <a:stretch>
-            <a:fillRect/>
-          </a:stretch>
-        </p:blipFill>
-        <p:spPr>
-          <a:xfrm>
-            <a:off x="8189279" y="1567203"/>
-            <a:ext cx="3400425" cy="2790825"/>
-          </a:xfrm>
-        </p:spPr>
-      </p:pic>
-      <p:pic>
-        <p:nvPicPr>
           <p:cNvPr id="9" name="Picture 8">
             <a:extLst>
               <a:ext uri="{FF2B5EF4-FFF2-40B4-BE49-F238E27FC236}">
@@ -6388,8 +6841,88 @@
             </a:r>
           </a:p>
           <a:p>
+            <a:pPr marL="457200" lvl="1" indent="0">
+              <a:buNone/>
+            </a:pPr>
+            <a:r>
+              <a:rPr lang="en-GB" dirty="0">
+                <a:latin typeface="Consolas" panose="020B0609020204030204" pitchFamily="49" charset="0"/>
+              </a:rPr>
+              <a:t>Unmanned Aerial Systems </a:t>
+            </a:r>
+            <a:br>
+              <a:rPr lang="en-GB" dirty="0">
+                <a:latin typeface="Consolas" panose="020B0609020204030204" pitchFamily="49" charset="0"/>
+              </a:rPr>
+            </a:br>
+            <a:r>
+              <a:rPr lang="en-GB" dirty="0">
+                <a:latin typeface="Consolas" panose="020B0609020204030204" pitchFamily="49" charset="0"/>
+              </a:rPr>
+              <a:t>Management and Control</a:t>
+            </a:r>
+          </a:p>
+          <a:p>
+            <a:pPr marL="457200" lvl="1" indent="0">
+              <a:buNone/>
+            </a:pPr>
+            <a:endParaRPr lang="en-GB" dirty="0">
+              <a:latin typeface="Consolas" panose="020B0609020204030204" pitchFamily="49" charset="0"/>
+            </a:endParaRPr>
+          </a:p>
+          <a:p>
             <a:pPr lvl="1"/>
-            <a:endParaRPr lang="en-GB" dirty="0">
+            <a:r>
+              <a:rPr lang="en-GB" sz="2000" dirty="0">
+                <a:latin typeface="Consolas" panose="020B0609020204030204" pitchFamily="49" charset="0"/>
+              </a:rPr>
+              <a:t>research environment </a:t>
+            </a:r>
+          </a:p>
+          <a:p>
+            <a:pPr lvl="1"/>
+            <a:endParaRPr lang="en-GB" sz="2000" dirty="0">
+              <a:latin typeface="Consolas" panose="020B0609020204030204" pitchFamily="49" charset="0"/>
+            </a:endParaRPr>
+          </a:p>
+          <a:p>
+            <a:pPr lvl="1"/>
+            <a:r>
+              <a:rPr lang="en-GB" sz="2000" dirty="0">
+                <a:latin typeface="Consolas" panose="020B0609020204030204" pitchFamily="49" charset="0"/>
+              </a:rPr>
+              <a:t>framework for controlling </a:t>
+            </a:r>
+            <a:br>
+              <a:rPr lang="en-GB" sz="2000" dirty="0">
+                <a:latin typeface="Consolas" panose="020B0609020204030204" pitchFamily="49" charset="0"/>
+              </a:rPr>
+            </a:br>
+            <a:r>
+              <a:rPr lang="en-GB" sz="2000" dirty="0">
+                <a:latin typeface="Consolas" panose="020B0609020204030204" pitchFamily="49" charset="0"/>
+              </a:rPr>
+              <a:t>and coordinating the flight</a:t>
+            </a:r>
+          </a:p>
+          <a:p>
+            <a:pPr lvl="1"/>
+            <a:endParaRPr lang="en-GB" sz="2000" dirty="0">
+              <a:latin typeface="Consolas" panose="020B0609020204030204" pitchFamily="49" charset="0"/>
+            </a:endParaRPr>
+          </a:p>
+          <a:p>
+            <a:pPr lvl="1"/>
+            <a:r>
+              <a:rPr lang="en-AT" sz="2000" dirty="0">
+                <a:latin typeface="Consolas" panose="020B0609020204030204" pitchFamily="49" charset="0"/>
+              </a:rPr>
+              <a:t>https://dronology.info/</a:t>
+            </a:r>
+          </a:p>
+          <a:p>
+            <a:pPr lvl="1"/>
+            <a:endParaRPr lang="en-GB" sz="2000" dirty="0">
               <a:latin typeface="Consolas" panose="020B0609020204030204" pitchFamily="49" charset="0"/>
             </a:endParaRPr>
           </a:p>
@@ -6423,49 +6956,14 @@
         </p:blipFill>
         <p:spPr>
           <a:xfrm>
-            <a:off x="8346612" y="147743"/>
-            <a:ext cx="3665095" cy="2441011"/>
+            <a:off x="9346367" y="199514"/>
+            <a:ext cx="2470468" cy="1645371"/>
           </a:xfrm>
           <a:prstGeom prst="rect">
             <a:avLst/>
           </a:prstGeom>
         </p:spPr>
       </p:pic>
-      <p:sp>
-        <p:nvSpPr>
-          <p:cNvPr id="6" name="TextBox 5">
-            <a:extLst>
-              <a:ext uri="{FF2B5EF4-FFF2-40B4-BE49-F238E27FC236}">
-                <a16:creationId xmlns:a16="http://schemas.microsoft.com/office/drawing/2014/main" id="{C0B06841-6A97-38C8-8C2B-50FC8D0D5FA4}"/>
-              </a:ext>
-            </a:extLst>
-          </p:cNvPr>
-          <p:cNvSpPr txBox="1"/>
-          <p:nvPr/>
-        </p:nvSpPr>
-        <p:spPr>
-          <a:xfrm>
-            <a:off x="1192345" y="6492875"/>
-            <a:ext cx="6097248" cy="246221"/>
-          </a:xfrm>
-          <a:prstGeom prst="rect">
-            <a:avLst/>
-          </a:prstGeom>
-          <a:noFill/>
-        </p:spPr>
-        <p:txBody>
-          <a:bodyPr wrap="square">
-            <a:spAutoFit/>
-          </a:bodyPr>
-          <a:lstStyle/>
-          <a:p>
-            <a:r>
-              <a:rPr lang="en-AT" sz="1000" dirty="0"/>
-              <a:t>https://dronology.info/</a:t>
-            </a:r>
-          </a:p>
-        </p:txBody>
-      </p:sp>
       <p:pic>
         <p:nvPicPr>
           <p:cNvPr id="7" name="Picture 6" descr="A diagram of a system&#10;&#10;AI-generated content may be incorrect.">
@@ -6494,8 +6992,8 @@
         </p:blipFill>
         <p:spPr>
           <a:xfrm>
-            <a:off x="1873770" y="2284163"/>
-            <a:ext cx="5874895" cy="3892800"/>
+            <a:off x="5591331" y="2260899"/>
+            <a:ext cx="6445770" cy="4271071"/>
           </a:xfrm>
           <a:prstGeom prst="rect">
             <a:avLst/>
@@ -6534,122 +7032,132 @@
       </p:grpSpPr>
       <p:sp>
         <p:nvSpPr>
-          <p:cNvPr id="2" name="Title 1">
-            <a:extLst>
-              <a:ext uri="{FF2B5EF4-FFF2-40B4-BE49-F238E27FC236}">
-                <a16:creationId xmlns:a16="http://schemas.microsoft.com/office/drawing/2014/main" id="{1F7CB6FD-3E1F-2106-AB44-D5433E1BD859}"/>
-              </a:ext>
-            </a:extLst>
-          </p:cNvPr>
-          <p:cNvSpPr>
-            <a:spLocks noGrp="1"/>
-          </p:cNvSpPr>
-          <p:nvPr>
-            <p:ph type="title"/>
-          </p:nvPr>
-        </p:nvSpPr>
-        <p:spPr/>
+          <p:cNvPr id="3" name="Content Placeholder 2">
+            <a:extLst>
+              <a:ext uri="{FF2B5EF4-FFF2-40B4-BE49-F238E27FC236}">
+                <a16:creationId xmlns:a16="http://schemas.microsoft.com/office/drawing/2014/main" id="{B1DA438F-5413-F9F1-89D8-9609E2FC78E3}"/>
+              </a:ext>
+            </a:extLst>
+          </p:cNvPr>
+          <p:cNvSpPr>
+            <a:spLocks noGrp="1"/>
+          </p:cNvSpPr>
+          <p:nvPr>
+            <p:ph idx="1"/>
+          </p:nvPr>
+        </p:nvSpPr>
+        <p:spPr>
+          <a:xfrm>
+            <a:off x="838200" y="1458978"/>
+            <a:ext cx="10515600" cy="4351338"/>
+          </a:xfrm>
+        </p:spPr>
         <p:txBody>
           <a:bodyPr/>
           <a:lstStyle/>
           <a:p>
             <a:r>
-              <a:rPr lang="en-GB" dirty="0">
-                <a:latin typeface="Consolas" panose="020B0609020204030204" pitchFamily="49" charset="0"/>
-              </a:rPr>
-              <a:t>Prompt Engineering techniques </a:t>
-            </a:r>
-            <a:endParaRPr lang="en-AT" dirty="0">
-              <a:latin typeface="Consolas" panose="020B0609020204030204" pitchFamily="49" charset="0"/>
-            </a:endParaRPr>
-          </a:p>
-        </p:txBody>
-      </p:sp>
-      <p:sp>
-        <p:nvSpPr>
-          <p:cNvPr id="3" name="Content Placeholder 2">
-            <a:extLst>
-              <a:ext uri="{FF2B5EF4-FFF2-40B4-BE49-F238E27FC236}">
-                <a16:creationId xmlns:a16="http://schemas.microsoft.com/office/drawing/2014/main" id="{55D9D6CC-D1AB-939C-3B8A-914D47CCE9A0}"/>
-              </a:ext>
-            </a:extLst>
-          </p:cNvPr>
-          <p:cNvSpPr>
-            <a:spLocks noGrp="1"/>
-          </p:cNvSpPr>
-          <p:nvPr>
-            <p:ph idx="1"/>
-          </p:nvPr>
-        </p:nvSpPr>
-        <p:spPr/>
-        <p:txBody>
-          <a:bodyPr/>
-          <a:lstStyle/>
-          <a:p>
-            <a:r>
-              <a:rPr lang="en-GB" dirty="0">
-                <a:latin typeface="Consolas" panose="020B0609020204030204" pitchFamily="49" charset="0"/>
-              </a:rPr>
-              <a:t>Zero shot learning</a:t>
-            </a:r>
-          </a:p>
-          <a:p>
-            <a:r>
-              <a:rPr lang="en-GB" dirty="0">
-                <a:latin typeface="Consolas" panose="020B0609020204030204" pitchFamily="49" charset="0"/>
-              </a:rPr>
-              <a:t>Chain of thought prompting</a:t>
-            </a:r>
-          </a:p>
-          <a:p>
-            <a:r>
-              <a:rPr lang="en-GB" dirty="0">
-                <a:latin typeface="Consolas" panose="020B0609020204030204" pitchFamily="49" charset="0"/>
-              </a:rPr>
-              <a:t>Personas</a:t>
-            </a:r>
-          </a:p>
-          <a:p>
-            <a:r>
-              <a:rPr lang="en-GB" dirty="0">
-                <a:latin typeface="Consolas" panose="020B0609020204030204" pitchFamily="49" charset="0"/>
-              </a:rPr>
-              <a:t>Providing context</a:t>
-            </a:r>
-          </a:p>
-          <a:p>
-            <a:r>
-              <a:rPr lang="en-GB" dirty="0">
-                <a:latin typeface="Consolas" panose="020B0609020204030204" pitchFamily="49" charset="0"/>
-              </a:rPr>
-              <a:t>Multimodality</a:t>
-            </a:r>
-          </a:p>
-          <a:p>
-            <a:r>
-              <a:rPr lang="en-GB" dirty="0">
-                <a:latin typeface="Consolas" panose="020B0609020204030204" pitchFamily="49" charset="0"/>
-              </a:rPr>
-              <a:t>Tree of thought</a:t>
-            </a:r>
-          </a:p>
-          <a:p>
-            <a:r>
-              <a:rPr lang="en-GB" dirty="0">
-                <a:latin typeface="Consolas" panose="020B0609020204030204" pitchFamily="49" charset="0"/>
-              </a:rPr>
-              <a:t>Chain of density</a:t>
-            </a:r>
-            <a:endParaRPr lang="en-AT" dirty="0">
-              <a:latin typeface="Consolas" panose="020B0609020204030204" pitchFamily="49" charset="0"/>
-            </a:endParaRPr>
-          </a:p>
-        </p:txBody>
-      </p:sp>
+              <a:rPr lang="en-GB" dirty="0"/>
+              <a:t>99 Requirements</a:t>
+            </a:r>
+            <a:endParaRPr lang="en-AT" dirty="0"/>
+          </a:p>
+        </p:txBody>
+      </p:sp>
+      <p:pic>
+        <p:nvPicPr>
+          <p:cNvPr id="5" name="Picture 4">
+            <a:extLst>
+              <a:ext uri="{FF2B5EF4-FFF2-40B4-BE49-F238E27FC236}">
+                <a16:creationId xmlns:a16="http://schemas.microsoft.com/office/drawing/2014/main" id="{B8E5F2F9-9753-FF9C-7EBE-D14CABCFCF02}"/>
+              </a:ext>
+            </a:extLst>
+          </p:cNvPr>
+          <p:cNvPicPr>
+            <a:picLocks noChangeAspect="1"/>
+          </p:cNvPicPr>
+          <p:nvPr/>
+        </p:nvPicPr>
+        <p:blipFill>
+          <a:blip r:embed="rId2"/>
+          <a:stretch>
+            <a:fillRect/>
+          </a:stretch>
+        </p:blipFill>
+        <p:spPr>
+          <a:xfrm>
+            <a:off x="920178" y="2107568"/>
+            <a:ext cx="9906000" cy="1085850"/>
+          </a:xfrm>
+          <a:prstGeom prst="rect">
+            <a:avLst/>
+          </a:prstGeom>
+        </p:spPr>
+      </p:pic>
+      <p:pic>
+        <p:nvPicPr>
+          <p:cNvPr id="7" name="Picture 6">
+            <a:extLst>
+              <a:ext uri="{FF2B5EF4-FFF2-40B4-BE49-F238E27FC236}">
+                <a16:creationId xmlns:a16="http://schemas.microsoft.com/office/drawing/2014/main" id="{D837A745-121B-4935-E946-8711B1904B06}"/>
+              </a:ext>
+            </a:extLst>
+          </p:cNvPr>
+          <p:cNvPicPr>
+            <a:picLocks noChangeAspect="1"/>
+          </p:cNvPicPr>
+          <p:nvPr/>
+        </p:nvPicPr>
+        <p:blipFill>
+          <a:blip r:embed="rId3"/>
+          <a:stretch>
+            <a:fillRect/>
+          </a:stretch>
+        </p:blipFill>
+        <p:spPr>
+          <a:xfrm>
+            <a:off x="920178" y="4569457"/>
+            <a:ext cx="9886950" cy="923925"/>
+          </a:xfrm>
+          <a:prstGeom prst="rect">
+            <a:avLst/>
+          </a:prstGeom>
+        </p:spPr>
+      </p:pic>
+      <p:pic>
+        <p:nvPicPr>
+          <p:cNvPr id="9" name="Picture 8">
+            <a:extLst>
+              <a:ext uri="{FF2B5EF4-FFF2-40B4-BE49-F238E27FC236}">
+                <a16:creationId xmlns:a16="http://schemas.microsoft.com/office/drawing/2014/main" id="{B0002559-88D5-E759-23AB-5D3BA4E8B464}"/>
+              </a:ext>
+            </a:extLst>
+          </p:cNvPr>
+          <p:cNvPicPr>
+            <a:picLocks noChangeAspect="1"/>
+          </p:cNvPicPr>
+          <p:nvPr/>
+        </p:nvPicPr>
+        <p:blipFill>
+          <a:blip r:embed="rId4"/>
+          <a:stretch>
+            <a:fillRect/>
+          </a:stretch>
+        </p:blipFill>
+        <p:spPr>
+          <a:xfrm>
+            <a:off x="920178" y="3429000"/>
+            <a:ext cx="9886950" cy="904875"/>
+          </a:xfrm>
+          <a:prstGeom prst="rect">
+            <a:avLst/>
+          </a:prstGeom>
+        </p:spPr>
+      </p:pic>
     </p:spTree>
     <p:extLst>
       <p:ext uri="{BB962C8B-B14F-4D97-AF65-F5344CB8AC3E}">
-        <p14:creationId xmlns:p14="http://schemas.microsoft.com/office/powerpoint/2010/main" val="651094963"/>
+        <p14:creationId xmlns:p14="http://schemas.microsoft.com/office/powerpoint/2010/main" val="1375322924"/>
       </p:ext>
     </p:extLst>
   </p:cSld>
@@ -6681,7 +7189,7 @@
           <p:cNvPr id="2" name="Title 1">
             <a:extLst>
               <a:ext uri="{FF2B5EF4-FFF2-40B4-BE49-F238E27FC236}">
-                <a16:creationId xmlns:a16="http://schemas.microsoft.com/office/drawing/2014/main" id="{6C5F31E6-15D6-3903-0759-AF3BB7F43C65}"/>
+                <a16:creationId xmlns:a16="http://schemas.microsoft.com/office/drawing/2014/main" id="{1F7CB6FD-3E1F-2106-AB44-D5433E1BD859}"/>
               </a:ext>
             </a:extLst>
           </p:cNvPr>
@@ -6701,7 +7209,7 @@
               <a:rPr lang="en-GB" dirty="0">
                 <a:latin typeface="Consolas" panose="020B0609020204030204" pitchFamily="49" charset="0"/>
               </a:rPr>
-              <a:t>Results</a:t>
+              <a:t>Prompt Engineering techniques </a:t>
             </a:r>
             <a:endParaRPr lang="en-AT" dirty="0">
               <a:latin typeface="Consolas" panose="020B0609020204030204" pitchFamily="49" charset="0"/>
@@ -6714,7 +7222,7 @@
           <p:cNvPr id="3" name="Content Placeholder 2">
             <a:extLst>
               <a:ext uri="{FF2B5EF4-FFF2-40B4-BE49-F238E27FC236}">
-                <a16:creationId xmlns:a16="http://schemas.microsoft.com/office/drawing/2014/main" id="{D35BD819-E768-0DFD-90C5-0AB0A93E1026}"/>
+                <a16:creationId xmlns:a16="http://schemas.microsoft.com/office/drawing/2014/main" id="{55D9D6CC-D1AB-939C-3B8A-914D47CCE9A0}"/>
               </a:ext>
             </a:extLst>
           </p:cNvPr>
@@ -6734,7 +7242,7 @@
               <a:rPr lang="en-GB" dirty="0">
                 <a:latin typeface="Consolas" panose="020B0609020204030204" pitchFamily="49" charset="0"/>
               </a:rPr>
-              <a:t>Prompts examples …</a:t>
+              <a:t>Zero shot learning</a:t>
             </a:r>
           </a:p>
           <a:p>
@@ -6742,7 +7250,7 @@
               <a:rPr lang="en-GB" dirty="0">
                 <a:latin typeface="Consolas" panose="020B0609020204030204" pitchFamily="49" charset="0"/>
               </a:rPr>
-              <a:t>Models …</a:t>
+              <a:t>Chain of thought prompting</a:t>
             </a:r>
           </a:p>
           <a:p>
@@ -6750,24 +7258,50 @@
               <a:rPr lang="en-GB" dirty="0">
                 <a:latin typeface="Consolas" panose="020B0609020204030204" pitchFamily="49" charset="0"/>
               </a:rPr>
-              <a:t>Quality of output visualization</a:t>
-            </a:r>
-          </a:p>
-          <a:p>
-            <a:pPr lvl="1"/>
+              <a:t>Personas</a:t>
+            </a:r>
+          </a:p>
+          <a:p>
             <a:r>
               <a:rPr lang="en-GB" dirty="0">
                 <a:latin typeface="Consolas" panose="020B0609020204030204" pitchFamily="49" charset="0"/>
               </a:rPr>
-              <a:t>Performance of different prompts …</a:t>
-            </a:r>
+              <a:t>Providing context</a:t>
+            </a:r>
+          </a:p>
+          <a:p>
+            <a:r>
+              <a:rPr lang="en-GB" dirty="0">
+                <a:latin typeface="Consolas" panose="020B0609020204030204" pitchFamily="49" charset="0"/>
+              </a:rPr>
+              <a:t>Multimodality</a:t>
+            </a:r>
+          </a:p>
+          <a:p>
+            <a:r>
+              <a:rPr lang="en-GB" dirty="0">
+                <a:latin typeface="Consolas" panose="020B0609020204030204" pitchFamily="49" charset="0"/>
+              </a:rPr>
+              <a:t>Tree of thought</a:t>
+            </a:r>
+          </a:p>
+          <a:p>
+            <a:r>
+              <a:rPr lang="en-GB" dirty="0">
+                <a:latin typeface="Consolas" panose="020B0609020204030204" pitchFamily="49" charset="0"/>
+              </a:rPr>
+              <a:t>Chain of density</a:t>
+            </a:r>
+            <a:endParaRPr lang="en-AT" dirty="0">
+              <a:latin typeface="Consolas" panose="020B0609020204030204" pitchFamily="49" charset="0"/>
+            </a:endParaRPr>
           </a:p>
         </p:txBody>
       </p:sp>
     </p:spTree>
     <p:extLst>
       <p:ext uri="{BB962C8B-B14F-4D97-AF65-F5344CB8AC3E}">
-        <p14:creationId xmlns:p14="http://schemas.microsoft.com/office/powerpoint/2010/main" val="3803775241"/>
+        <p14:creationId xmlns:p14="http://schemas.microsoft.com/office/powerpoint/2010/main" val="651094963"/>
       </p:ext>
     </p:extLst>
   </p:cSld>
@@ -6799,7 +7333,7 @@
           <p:cNvPr id="2" name="Title 1">
             <a:extLst>
               <a:ext uri="{FF2B5EF4-FFF2-40B4-BE49-F238E27FC236}">
-                <a16:creationId xmlns:a16="http://schemas.microsoft.com/office/drawing/2014/main" id="{46FE4B27-60D4-B8B2-87CB-62D6922487A6}"/>
+                <a16:creationId xmlns:a16="http://schemas.microsoft.com/office/drawing/2014/main" id="{6C5F31E6-15D6-3903-0759-AF3BB7F43C65}"/>
               </a:ext>
             </a:extLst>
           </p:cNvPr>
@@ -6819,7 +7353,7 @@
               <a:rPr lang="en-GB" dirty="0">
                 <a:latin typeface="Consolas" panose="020B0609020204030204" pitchFamily="49" charset="0"/>
               </a:rPr>
-              <a:t>Q &amp; A</a:t>
+              <a:t>Results</a:t>
             </a:r>
             <a:endParaRPr lang="en-AT" dirty="0">
               <a:latin typeface="Consolas" panose="020B0609020204030204" pitchFamily="49" charset="0"/>
@@ -6832,7 +7366,7 @@
           <p:cNvPr id="3" name="Content Placeholder 2">
             <a:extLst>
               <a:ext uri="{FF2B5EF4-FFF2-40B4-BE49-F238E27FC236}">
-                <a16:creationId xmlns:a16="http://schemas.microsoft.com/office/drawing/2014/main" id="{F9D6AE6E-165B-9A93-3AE4-16307F2A134A}"/>
+                <a16:creationId xmlns:a16="http://schemas.microsoft.com/office/drawing/2014/main" id="{D35BD819-E768-0DFD-90C5-0AB0A93E1026}"/>
               </a:ext>
             </a:extLst>
           </p:cNvPr>
@@ -6848,16 +7382,44 @@
           <a:bodyPr/>
           <a:lstStyle/>
           <a:p>
-            <a:endParaRPr lang="en-AT" dirty="0">
-              <a:latin typeface="Consolas" panose="020B0609020204030204" pitchFamily="49" charset="0"/>
-            </a:endParaRPr>
+            <a:r>
+              <a:rPr lang="en-GB" dirty="0">
+                <a:latin typeface="Consolas" panose="020B0609020204030204" pitchFamily="49" charset="0"/>
+              </a:rPr>
+              <a:t>Prompts examples …</a:t>
+            </a:r>
+          </a:p>
+          <a:p>
+            <a:r>
+              <a:rPr lang="en-GB" dirty="0">
+                <a:latin typeface="Consolas" panose="020B0609020204030204" pitchFamily="49" charset="0"/>
+              </a:rPr>
+              <a:t>Models …</a:t>
+            </a:r>
+          </a:p>
+          <a:p>
+            <a:r>
+              <a:rPr lang="en-GB" dirty="0">
+                <a:latin typeface="Consolas" panose="020B0609020204030204" pitchFamily="49" charset="0"/>
+              </a:rPr>
+              <a:t>Quality of output visualization</a:t>
+            </a:r>
+          </a:p>
+          <a:p>
+            <a:pPr lvl="1"/>
+            <a:r>
+              <a:rPr lang="en-GB" dirty="0">
+                <a:latin typeface="Consolas" panose="020B0609020204030204" pitchFamily="49" charset="0"/>
+              </a:rPr>
+              <a:t>Performance of different prompts …</a:t>
+            </a:r>
           </a:p>
         </p:txBody>
       </p:sp>
     </p:spTree>
     <p:extLst>
       <p:ext uri="{BB962C8B-B14F-4D97-AF65-F5344CB8AC3E}">
-        <p14:creationId xmlns:p14="http://schemas.microsoft.com/office/powerpoint/2010/main" val="3851137163"/>
+        <p14:creationId xmlns:p14="http://schemas.microsoft.com/office/powerpoint/2010/main" val="3803775241"/>
       </p:ext>
     </p:extLst>
   </p:cSld>
@@ -6870,7 +7432,7 @@
 <file path=ppt/theme/theme1.xml><?xml version="1.0" encoding="utf-8"?>
 <a:theme xmlns:a="http://schemas.openxmlformats.org/drawingml/2006/main" name="Office Theme">
   <a:themeElements>
-    <a:clrScheme name="Office">
+    <a:clrScheme name="Custom 1">
       <a:dk1>
         <a:sysClr val="windowText" lastClr="000000"/>
       </a:dk1>
@@ -6908,110 +7470,16 @@
         <a:srgbClr val="96607D"/>
       </a:folHlink>
     </a:clrScheme>
-    <a:fontScheme name="Office">
+    <a:fontScheme name="Custom 2">
       <a:majorFont>
-        <a:latin typeface="Aptos Display" panose="02110004020202020204"/>
+        <a:latin typeface="Consolas"/>
         <a:ea typeface=""/>
         <a:cs typeface=""/>
-        <a:font script="Jpan" typeface="游ゴシック Light"/>
-        <a:font script="Hang" typeface="맑은 고딕"/>
-        <a:font script="Hans" typeface="等线 Light"/>
-        <a:font script="Hant" typeface="新細明體"/>
-        <a:font script="Arab" typeface="Times New Roman"/>
-        <a:font script="Hebr" typeface="Times New Roman"/>
-        <a:font script="Thai" typeface="Angsana New"/>
-        <a:font script="Ethi" typeface="Nyala"/>
-        <a:font script="Beng" typeface="Vrinda"/>
-        <a:font script="Gujr" typeface="Shruti"/>
-        <a:font script="Khmr" typeface="MoolBoran"/>
-        <a:font script="Knda" typeface="Tunga"/>
-        <a:font script="Guru" typeface="Raavi"/>
-        <a:font script="Cans" typeface="Euphemia"/>
-        <a:font script="Cher" typeface="Plantagenet Cherokee"/>
-        <a:font script="Yiii" typeface="Microsoft Yi Baiti"/>
-        <a:font script="Tibt" typeface="Microsoft Himalaya"/>
-        <a:font script="Thaa" typeface="MV Boli"/>
-        <a:font script="Deva" typeface="Mangal"/>
-        <a:font script="Telu" typeface="Gautami"/>
-        <a:font script="Taml" typeface="Latha"/>
-        <a:font script="Syrc" typeface="Estrangelo Edessa"/>
-        <a:font script="Orya" typeface="Kalinga"/>
-        <a:font script="Mlym" typeface="Kartika"/>
-        <a:font script="Laoo" typeface="DokChampa"/>
-        <a:font script="Sinh" typeface="Iskoola Pota"/>
-        <a:font script="Mong" typeface="Mongolian Baiti"/>
-        <a:font script="Viet" typeface="Times New Roman"/>
-        <a:font script="Uigh" typeface="Microsoft Uighur"/>
-        <a:font script="Geor" typeface="Sylfaen"/>
-        <a:font script="Armn" typeface="Arial"/>
-        <a:font script="Bugi" typeface="Leelawadee UI"/>
-        <a:font script="Bopo" typeface="Microsoft JhengHei"/>
-        <a:font script="Java" typeface="Javanese Text"/>
-        <a:font script="Lisu" typeface="Segoe UI"/>
-        <a:font script="Mymr" typeface="Myanmar Text"/>
-        <a:font script="Nkoo" typeface="Ebrima"/>
-        <a:font script="Olck" typeface="Nirmala UI"/>
-        <a:font script="Osma" typeface="Ebrima"/>
-        <a:font script="Phag" typeface="Phagspa"/>
-        <a:font script="Syrn" typeface="Estrangelo Edessa"/>
-        <a:font script="Syrj" typeface="Estrangelo Edessa"/>
-        <a:font script="Syre" typeface="Estrangelo Edessa"/>
-        <a:font script="Sora" typeface="Nirmala UI"/>
-        <a:font script="Tale" typeface="Microsoft Tai Le"/>
-        <a:font script="Talu" typeface="Microsoft New Tai Lue"/>
-        <a:font script="Tfng" typeface="Ebrima"/>
       </a:majorFont>
       <a:minorFont>
-        <a:latin typeface="Aptos" panose="02110004020202020204"/>
+        <a:latin typeface="Consolas"/>
         <a:ea typeface=""/>
         <a:cs typeface=""/>
-        <a:font script="Jpan" typeface="游ゴシック"/>
-        <a:font script="Hang" typeface="맑은 고딕"/>
-        <a:font script="Hans" typeface="等线"/>
-        <a:font script="Hant" typeface="新細明體"/>
-        <a:font script="Arab" typeface="Arial"/>
-        <a:font script="Hebr" typeface="Arial"/>
-        <a:font script="Thai" typeface="Cordia New"/>
-        <a:font script="Ethi" typeface="Nyala"/>
-        <a:font script="Beng" typeface="Vrinda"/>
-        <a:font script="Gujr" typeface="Shruti"/>
-        <a:font script="Khmr" typeface="DaunPenh"/>
-        <a:font script="Knda" typeface="Tunga"/>
-        <a:font script="Guru" typeface="Raavi"/>
-        <a:font script="Cans" typeface="Euphemia"/>
-        <a:font script="Cher" typeface="Plantagenet Cherokee"/>
-        <a:font script="Yiii" typeface="Microsoft Yi Baiti"/>
-        <a:font script="Tibt" typeface="Microsoft Himalaya"/>
-        <a:font script="Thaa" typeface="MV Boli"/>
-        <a:font script="Deva" typeface="Mangal"/>
-        <a:font script="Telu" typeface="Gautami"/>
-        <a:font script="Taml" typeface="Latha"/>
-        <a:font script="Syrc" typeface="Estrangelo Edessa"/>
-        <a:font script="Orya" typeface="Kalinga"/>
-        <a:font script="Mlym" typeface="Kartika"/>
-        <a:font script="Laoo" typeface="DokChampa"/>
-        <a:font script="Sinh" typeface="Iskoola Pota"/>
-        <a:font script="Mong" typeface="Mongolian Baiti"/>
-        <a:font script="Viet" typeface="Arial"/>
-        <a:font script="Uigh" typeface="Microsoft Uighur"/>
-        <a:font script="Geor" typeface="Sylfaen"/>
-        <a:font script="Armn" typeface="Arial"/>
-        <a:font script="Bugi" typeface="Leelawadee UI"/>
-        <a:font script="Bopo" typeface="Microsoft JhengHei"/>
-        <a:font script="Java" typeface="Javanese Text"/>
-        <a:font script="Lisu" typeface="Segoe UI"/>
-        <a:font script="Mymr" typeface="Myanmar Text"/>
-        <a:font script="Nkoo" typeface="Ebrima"/>
-        <a:font script="Olck" typeface="Nirmala UI"/>
-        <a:font script="Osma" typeface="Ebrima"/>
-        <a:font script="Phag" typeface="Phagspa"/>
-        <a:font script="Syrn" typeface="Estrangelo Edessa"/>
-        <a:font script="Syrj" typeface="Estrangelo Edessa"/>
-        <a:font script="Syre" typeface="Estrangelo Edessa"/>
-        <a:font script="Sora" typeface="Nirmala UI"/>
-        <a:font script="Tale" typeface="Microsoft Tai Le"/>
-        <a:font script="Talu" typeface="Microsoft New Tai Lue"/>
-        <a:font script="Tfng" typeface="Ebrima"/>
       </a:minorFont>
     </a:fontScheme>
     <a:fmtScheme name="Office">

</xml_diff>